<commit_message>
Updated slides with reminder
</commit_message>
<xml_diff>
--- a/Slides/On-Campus/05_01_InclusiveDesignandExpressions.pptx
+++ b/Slides/On-Campus/05_01_InclusiveDesignandExpressions.pptx
@@ -5,26 +5,27 @@
     <p:sldMasterId id="2147483648" r:id="rId1"/>
   </p:sldMasterIdLst>
   <p:notesMasterIdLst>
-    <p:notesMasterId r:id="rId16"/>
+    <p:notesMasterId r:id="rId17"/>
   </p:notesMasterIdLst>
   <p:handoutMasterIdLst>
-    <p:handoutMasterId r:id="rId17"/>
+    <p:handoutMasterId r:id="rId18"/>
   </p:handoutMasterIdLst>
   <p:sldIdLst>
     <p:sldId id="265" r:id="rId2"/>
-    <p:sldId id="266" r:id="rId3"/>
-    <p:sldId id="267" r:id="rId4"/>
-    <p:sldId id="259" r:id="rId5"/>
-    <p:sldId id="268" r:id="rId6"/>
-    <p:sldId id="258" r:id="rId7"/>
-    <p:sldId id="262" r:id="rId8"/>
-    <p:sldId id="263" r:id="rId9"/>
-    <p:sldId id="260" r:id="rId10"/>
-    <p:sldId id="270" r:id="rId11"/>
-    <p:sldId id="261" r:id="rId12"/>
-    <p:sldId id="257" r:id="rId13"/>
-    <p:sldId id="269" r:id="rId14"/>
-    <p:sldId id="264" r:id="rId15"/>
+    <p:sldId id="271" r:id="rId3"/>
+    <p:sldId id="266" r:id="rId4"/>
+    <p:sldId id="267" r:id="rId5"/>
+    <p:sldId id="259" r:id="rId6"/>
+    <p:sldId id="268" r:id="rId7"/>
+    <p:sldId id="258" r:id="rId8"/>
+    <p:sldId id="262" r:id="rId9"/>
+    <p:sldId id="263" r:id="rId10"/>
+    <p:sldId id="260" r:id="rId11"/>
+    <p:sldId id="270" r:id="rId12"/>
+    <p:sldId id="261" r:id="rId13"/>
+    <p:sldId id="257" r:id="rId14"/>
+    <p:sldId id="269" r:id="rId15"/>
+    <p:sldId id="264" r:id="rId16"/>
   </p:sldIdLst>
   <p:sldSz cx="13817600" cy="7772400"/>
   <p:notesSz cx="6858000" cy="9144000"/>
@@ -227,7 +228,7 @@
           <a:p>
             <a:fld id="{4D7E51A5-B478-1E40-8CBB-0DAA8831E99D}" type="datetimeFigureOut">
               <a:rPr lang="en-US" smtClean="0"/>
-              <a:t>9/15/21</a:t>
+              <a:t>9/20/2021</a:t>
             </a:fld>
             <a:endParaRPr lang="en-US"/>
           </a:p>
@@ -392,7 +393,7 @@
           <a:p>
             <a:fld id="{D0ED587F-861E-6740-9643-E3DDAE89B8D6}" type="datetimeFigureOut">
               <a:rPr lang="en-US" smtClean="0"/>
-              <a:t>9/15/21</a:t>
+              <a:t>9/20/2021</a:t>
             </a:fld>
             <a:endParaRPr lang="en-US"/>
           </a:p>
@@ -8879,6 +8880,297 @@
   <p:cSld>
     <p:spTree>
       <p:nvGrpSpPr>
+        <p:cNvPr id="1" name="Shape 212"/>
+        <p:cNvGrpSpPr/>
+        <p:nvPr/>
+      </p:nvGrpSpPr>
+      <p:grpSpPr>
+        <a:xfrm>
+          <a:off x="0" y="0"/>
+          <a:ext cx="0" cy="0"/>
+          <a:chOff x="0" y="0"/>
+          <a:chExt cx="0" cy="0"/>
+        </a:xfrm>
+      </p:grpSpPr>
+      <p:sp>
+        <p:nvSpPr>
+          <p:cNvPr id="213" name="Google Shape;213;p43"/>
+          <p:cNvSpPr txBox="1">
+            <a:spLocks noGrp="1"/>
+          </p:cNvSpPr>
+          <p:nvPr>
+            <p:ph type="title"/>
+          </p:nvPr>
+        </p:nvSpPr>
+        <p:spPr>
+          <a:xfrm>
+            <a:off x="628075" y="751389"/>
+            <a:ext cx="12561413" cy="1015467"/>
+          </a:xfrm>
+          <a:prstGeom prst="rect">
+            <a:avLst/>
+          </a:prstGeom>
+        </p:spPr>
+        <p:txBody>
+          <a:bodyPr spcFirstLastPara="1" vert="horz" wrap="square" lIns="91422" tIns="91422" rIns="91422" bIns="91422" rtlCol="0" anchor="b" anchorCtr="0">
+            <a:noAutofit/>
+          </a:bodyPr>
+          <a:lstStyle/>
+          <a:p>
+            <a:r>
+              <a:rPr lang="en" dirty="0"/>
+              <a:t>Modulo  - Extremely useful operation</a:t>
+            </a:r>
+            <a:endParaRPr dirty="0"/>
+          </a:p>
+        </p:txBody>
+      </p:sp>
+      <p:sp>
+        <p:nvSpPr>
+          <p:cNvPr id="214" name="Google Shape;214;p43"/>
+          <p:cNvSpPr txBox="1">
+            <a:spLocks noGrp="1"/>
+          </p:cNvSpPr>
+          <p:nvPr>
+            <p:ph type="body" idx="1"/>
+          </p:nvPr>
+        </p:nvSpPr>
+        <p:spPr>
+          <a:xfrm>
+            <a:off x="628075" y="1920725"/>
+            <a:ext cx="12561413" cy="2015520"/>
+          </a:xfrm>
+          <a:prstGeom prst="rect">
+            <a:avLst/>
+          </a:prstGeom>
+        </p:spPr>
+        <p:txBody>
+          <a:bodyPr spcFirstLastPara="1" vert="horz" wrap="square" lIns="91422" tIns="91422" rIns="91422" bIns="91422" rtlCol="0" anchor="t" anchorCtr="0">
+            <a:noAutofit/>
+          </a:bodyPr>
+          <a:lstStyle/>
+          <a:p>
+            <a:pPr marL="0" indent="0">
+              <a:buNone/>
+            </a:pPr>
+            <a:r>
+              <a:rPr lang="en"/>
+              <a:t>% - it is the remainder of a division statement?</a:t>
+            </a:r>
+            <a:endParaRPr dirty="0"/>
+          </a:p>
+          <a:p>
+            <a:pPr marL="0" indent="0">
+              <a:spcAft>
+                <a:spcPts val="604"/>
+              </a:spcAft>
+              <a:buNone/>
+            </a:pPr>
+            <a:endParaRPr dirty="0"/>
+          </a:p>
+        </p:txBody>
+      </p:sp>
+      <p:pic>
+        <p:nvPicPr>
+          <p:cNvPr id="215" name="Google Shape;215;p43"/>
+          <p:cNvPicPr preferRelativeResize="0"/>
+          <p:nvPr/>
+        </p:nvPicPr>
+        <p:blipFill>
+          <a:blip r:embed="rId3">
+            <a:alphaModFix/>
+          </a:blip>
+          <a:stretch>
+            <a:fillRect/>
+          </a:stretch>
+        </p:blipFill>
+        <p:spPr>
+          <a:xfrm>
+            <a:off x="862769" y="3004947"/>
+            <a:ext cx="3744545" cy="2808409"/>
+          </a:xfrm>
+          <a:prstGeom prst="rect">
+            <a:avLst/>
+          </a:prstGeom>
+          <a:noFill/>
+          <a:ln>
+            <a:noFill/>
+          </a:ln>
+        </p:spPr>
+      </p:pic>
+      <p:sp>
+        <p:nvSpPr>
+          <p:cNvPr id="216" name="Google Shape;216;p43"/>
+          <p:cNvSpPr txBox="1">
+            <a:spLocks noGrp="1"/>
+          </p:cNvSpPr>
+          <p:nvPr>
+            <p:ph type="body" idx="1"/>
+          </p:nvPr>
+        </p:nvSpPr>
+        <p:spPr>
+          <a:xfrm>
+            <a:off x="4607314" y="2868617"/>
+            <a:ext cx="6497627" cy="2926267"/>
+          </a:xfrm>
+          <a:prstGeom prst="rect">
+            <a:avLst/>
+          </a:prstGeom>
+        </p:spPr>
+        <p:txBody>
+          <a:bodyPr spcFirstLastPara="1" vert="horz" wrap="square" lIns="91422" tIns="91422" rIns="91422" bIns="91422" rtlCol="0" anchor="t" anchorCtr="0">
+            <a:noAutofit/>
+          </a:bodyPr>
+          <a:lstStyle/>
+          <a:p>
+            <a:r>
+              <a:rPr lang="en" dirty="0"/>
+              <a:t>Always return the remainder</a:t>
+            </a:r>
+            <a:endParaRPr dirty="0"/>
+          </a:p>
+          <a:p>
+            <a:pPr>
+              <a:spcBef>
+                <a:spcPts val="0"/>
+              </a:spcBef>
+            </a:pPr>
+            <a:r>
+              <a:rPr lang="en" dirty="0"/>
+              <a:t>So </a:t>
+            </a:r>
+            <a:endParaRPr dirty="0"/>
+          </a:p>
+          <a:p>
+            <a:pPr lvl="1">
+              <a:spcBef>
+                <a:spcPts val="0"/>
+              </a:spcBef>
+            </a:pPr>
+            <a:r>
+              <a:rPr lang="en" dirty="0">
+                <a:latin typeface="Consolas" panose="020B0609020204030204" pitchFamily="49" charset="0"/>
+                <a:cs typeface="Consolas" panose="020B0609020204030204" pitchFamily="49" charset="0"/>
+              </a:rPr>
+              <a:t>x = 250 % 6</a:t>
+            </a:r>
+            <a:endParaRPr dirty="0">
+              <a:latin typeface="Consolas" panose="020B0609020204030204" pitchFamily="49" charset="0"/>
+              <a:cs typeface="Consolas" panose="020B0609020204030204" pitchFamily="49" charset="0"/>
+            </a:endParaRPr>
+          </a:p>
+          <a:p>
+            <a:pPr lvl="1">
+              <a:spcBef>
+                <a:spcPts val="0"/>
+              </a:spcBef>
+            </a:pPr>
+            <a:r>
+              <a:rPr lang="en" dirty="0"/>
+              <a:t>x would be </a:t>
+            </a:r>
+            <a:r>
+              <a:rPr lang="en" b="1" dirty="0"/>
+              <a:t>4</a:t>
+            </a:r>
+            <a:endParaRPr dirty="0"/>
+          </a:p>
+          <a:p>
+            <a:pPr lvl="1">
+              <a:spcBef>
+                <a:spcPts val="0"/>
+              </a:spcBef>
+            </a:pPr>
+            <a:r>
+              <a:rPr lang="en" dirty="0"/>
+              <a:t>So combining them</a:t>
+            </a:r>
+            <a:endParaRPr dirty="0"/>
+          </a:p>
+          <a:p>
+            <a:pPr lvl="2">
+              <a:spcBef>
+                <a:spcPts val="0"/>
+              </a:spcBef>
+            </a:pPr>
+            <a:r>
+              <a:rPr lang="en" dirty="0">
+                <a:latin typeface="Consolas" panose="020B0609020204030204" pitchFamily="49" charset="0"/>
+                <a:cs typeface="Consolas" panose="020B0609020204030204" pitchFamily="49" charset="0"/>
+              </a:rPr>
+              <a:t>whole = 250 // 6</a:t>
+            </a:r>
+            <a:endParaRPr dirty="0">
+              <a:latin typeface="Consolas" panose="020B0609020204030204" pitchFamily="49" charset="0"/>
+              <a:cs typeface="Consolas" panose="020B0609020204030204" pitchFamily="49" charset="0"/>
+            </a:endParaRPr>
+          </a:p>
+          <a:p>
+            <a:pPr lvl="2">
+              <a:spcBef>
+                <a:spcPts val="0"/>
+              </a:spcBef>
+            </a:pPr>
+            <a:r>
+              <a:rPr lang="en" dirty="0">
+                <a:latin typeface="Consolas" panose="020B0609020204030204" pitchFamily="49" charset="0"/>
+                <a:cs typeface="Consolas" panose="020B0609020204030204" pitchFamily="49" charset="0"/>
+              </a:rPr>
+              <a:t>remainder = 250 % 6</a:t>
+            </a:r>
+            <a:endParaRPr dirty="0">
+              <a:latin typeface="Consolas" panose="020B0609020204030204" pitchFamily="49" charset="0"/>
+              <a:cs typeface="Consolas" panose="020B0609020204030204" pitchFamily="49" charset="0"/>
+            </a:endParaRPr>
+          </a:p>
+          <a:p>
+            <a:pPr lvl="2">
+              <a:spcBef>
+                <a:spcPts val="0"/>
+              </a:spcBef>
+            </a:pPr>
+            <a:r>
+              <a:rPr lang="en" dirty="0"/>
+              <a:t>whole = 41</a:t>
+            </a:r>
+            <a:endParaRPr dirty="0"/>
+          </a:p>
+          <a:p>
+            <a:pPr lvl="2">
+              <a:spcBef>
+                <a:spcPts val="0"/>
+              </a:spcBef>
+            </a:pPr>
+            <a:r>
+              <a:rPr lang="en" dirty="0"/>
+              <a:t>remainder = 4</a:t>
+            </a:r>
+            <a:endParaRPr dirty="0"/>
+          </a:p>
+          <a:p>
+            <a:pPr marL="0" indent="0">
+              <a:spcAft>
+                <a:spcPts val="604"/>
+              </a:spcAft>
+              <a:buNone/>
+            </a:pPr>
+            <a:endParaRPr dirty="0"/>
+          </a:p>
+        </p:txBody>
+      </p:sp>
+    </p:spTree>
+  </p:cSld>
+  <p:clrMapOvr>
+    <a:masterClrMapping/>
+  </p:clrMapOvr>
+</p:sld>
+</file>
+
+<file path=ppt/slides/slide11.xml><?xml version="1.0" encoding="utf-8"?>
+<p:sld xmlns:a="http://schemas.openxmlformats.org/drawingml/2006/main" xmlns:r="http://schemas.openxmlformats.org/officeDocument/2006/relationships" xmlns:p="http://schemas.openxmlformats.org/presentationml/2006/main">
+  <p:cSld>
+    <p:spTree>
+      <p:nvGrpSpPr>
         <p:cNvPr id="1" name=""/>
         <p:cNvGrpSpPr/>
         <p:nvPr/>
@@ -9197,7 +9489,7 @@
 </p:sld>
 </file>
 
-<file path=ppt/slides/slide11.xml><?xml version="1.0" encoding="utf-8"?>
+<file path=ppt/slides/slide12.xml><?xml version="1.0" encoding="utf-8"?>
 <p:sld xmlns:a="http://schemas.openxmlformats.org/drawingml/2006/main" xmlns:r="http://schemas.openxmlformats.org/officeDocument/2006/relationships" xmlns:p="http://schemas.openxmlformats.org/presentationml/2006/main">
   <p:cSld>
     <p:spTree>
@@ -9399,7 +9691,7 @@
 </p:sld>
 </file>
 
-<file path=ppt/slides/slide12.xml><?xml version="1.0" encoding="utf-8"?>
+<file path=ppt/slides/slide13.xml><?xml version="1.0" encoding="utf-8"?>
 <p:sld xmlns:a="http://schemas.openxmlformats.org/drawingml/2006/main" xmlns:r="http://schemas.openxmlformats.org/officeDocument/2006/relationships" xmlns:p="http://schemas.openxmlformats.org/presentationml/2006/main">
   <p:cSld>
     <p:spTree>
@@ -9715,7 +10007,7 @@
 </p:sld>
 </file>
 
-<file path=ppt/slides/slide13.xml><?xml version="1.0" encoding="utf-8"?>
+<file path=ppt/slides/slide14.xml><?xml version="1.0" encoding="utf-8"?>
 <p:sld xmlns:a="http://schemas.openxmlformats.org/drawingml/2006/main" xmlns:r="http://schemas.openxmlformats.org/officeDocument/2006/relationships" xmlns:p="http://schemas.openxmlformats.org/presentationml/2006/main">
   <p:cSld>
     <p:spTree>
@@ -10342,7 +10634,7 @@
 </p:sld>
 </file>
 
-<file path=ppt/slides/slide14.xml><?xml version="1.0" encoding="utf-8"?>
+<file path=ppt/slides/slide15.xml><?xml version="1.0" encoding="utf-8"?>
 <p:sld xmlns:a="http://schemas.openxmlformats.org/drawingml/2006/main" xmlns:r="http://schemas.openxmlformats.org/officeDocument/2006/relationships" xmlns:p="http://schemas.openxmlformats.org/presentationml/2006/main" show="0">
   <p:cSld>
     <p:spTree>
@@ -10791,13 +11083,13 @@
   <p:clrMapOvr>
     <a:masterClrMapping/>
   </p:clrMapOvr>
-  <mc:AlternateContent xmlns:mc="http://schemas.openxmlformats.org/markup-compatibility/2006">
-    <mc:Choice xmlns:p14="http://schemas.microsoft.com/office/powerpoint/2010/main" Requires="p14">
+  <mc:AlternateContent xmlns:mc="http://schemas.openxmlformats.org/markup-compatibility/2006" xmlns:p14="http://schemas.microsoft.com/office/powerpoint/2010/main">
+    <mc:Choice Requires="p14">
       <p:transition p14:dur="300">
         <p:fade/>
       </p:transition>
     </mc:Choice>
-    <mc:Fallback>
+    <mc:Fallback xmlns="">
       <p:transition>
         <p:fade/>
       </p:transition>
@@ -10807,6 +11099,566 @@
 </file>
 
 <file path=ppt/slides/slide2.xml><?xml version="1.0" encoding="utf-8"?>
+<p:sld xmlns:a="http://schemas.openxmlformats.org/drawingml/2006/main" xmlns:r="http://schemas.openxmlformats.org/officeDocument/2006/relationships" xmlns:p="http://schemas.openxmlformats.org/presentationml/2006/main">
+  <p:cSld>
+    <p:spTree>
+      <p:nvGrpSpPr>
+        <p:cNvPr id="1" name=""/>
+        <p:cNvGrpSpPr/>
+        <p:nvPr/>
+      </p:nvGrpSpPr>
+      <p:grpSpPr>
+        <a:xfrm>
+          <a:off x="0" y="0"/>
+          <a:ext cx="0" cy="0"/>
+          <a:chOff x="0" y="0"/>
+          <a:chExt cx="0" cy="0"/>
+        </a:xfrm>
+      </p:grpSpPr>
+      <p:sp>
+        <p:nvSpPr>
+          <p:cNvPr id="4" name="Title 3">
+            <a:extLst>
+              <a:ext uri="{FF2B5EF4-FFF2-40B4-BE49-F238E27FC236}">
+                <a16:creationId xmlns:a16="http://schemas.microsoft.com/office/drawing/2014/main" id="{4EB85848-D40E-C644-8BBD-356CFF5598D6}"/>
+              </a:ext>
+            </a:extLst>
+          </p:cNvPr>
+          <p:cNvSpPr>
+            <a:spLocks noGrp="1"/>
+          </p:cNvSpPr>
+          <p:nvPr>
+            <p:ph type="title"/>
+          </p:nvPr>
+        </p:nvSpPr>
+        <p:spPr/>
+        <p:txBody>
+          <a:bodyPr/>
+          <a:lstStyle/>
+          <a:p>
+            <a:r>
+              <a:rPr lang="en-US" dirty="0"/>
+              <a:t>Announcements </a:t>
+            </a:r>
+          </a:p>
+        </p:txBody>
+      </p:sp>
+      <p:sp>
+        <p:nvSpPr>
+          <p:cNvPr id="9" name="TextBox 8">
+            <a:extLst>
+              <a:ext uri="{FF2B5EF4-FFF2-40B4-BE49-F238E27FC236}">
+                <a16:creationId xmlns:a16="http://schemas.microsoft.com/office/drawing/2014/main" id="{175001E9-0D5B-864B-AB16-328450214CEC}"/>
+              </a:ext>
+            </a:extLst>
+          </p:cNvPr>
+          <p:cNvSpPr txBox="1"/>
+          <p:nvPr/>
+        </p:nvSpPr>
+        <p:spPr>
+          <a:xfrm>
+            <a:off x="9283700" y="5241643"/>
+            <a:ext cx="4533900" cy="2031325"/>
+          </a:xfrm>
+          <a:prstGeom prst="rect">
+            <a:avLst/>
+          </a:prstGeom>
+          <a:noFill/>
+        </p:spPr>
+        <p:txBody>
+          <a:bodyPr wrap="square">
+            <a:spAutoFit/>
+          </a:bodyPr>
+          <a:lstStyle/>
+          <a:p>
+            <a:pPr marL="0" marR="0">
+              <a:spcBef>
+                <a:spcPts val="0"/>
+              </a:spcBef>
+              <a:spcAft>
+                <a:spcPts val="0"/>
+              </a:spcAft>
+            </a:pPr>
+            <a:r>
+              <a:rPr lang="en-US" sz="1800" dirty="0">
+                <a:effectLst/>
+                <a:latin typeface="Calibri" panose="020F0502020204030204" pitchFamily="34" charset="0"/>
+                <a:ea typeface="Calibri" panose="020F0502020204030204" pitchFamily="34" charset="0"/>
+              </a:rPr>
+              <a:t>ACM Board Game Night</a:t>
+            </a:r>
+          </a:p>
+          <a:p>
+            <a:pPr marL="0" marR="0">
+              <a:spcBef>
+                <a:spcPts val="0"/>
+              </a:spcBef>
+              <a:spcAft>
+                <a:spcPts val="0"/>
+              </a:spcAft>
+            </a:pPr>
+            <a:r>
+              <a:rPr lang="en-US" sz="1800" dirty="0">
+                <a:effectLst/>
+                <a:latin typeface="Calibri" panose="020F0502020204030204" pitchFamily="34" charset="0"/>
+                <a:ea typeface="Calibri" panose="020F0502020204030204" pitchFamily="34" charset="0"/>
+              </a:rPr>
+              <a:t>When: Wednesday, September 22 at 6:00pm</a:t>
+            </a:r>
+          </a:p>
+          <a:p>
+            <a:pPr marL="0" marR="0">
+              <a:spcBef>
+                <a:spcPts val="0"/>
+              </a:spcBef>
+              <a:spcAft>
+                <a:spcPts val="0"/>
+              </a:spcAft>
+            </a:pPr>
+            <a:r>
+              <a:rPr lang="en-US" sz="1800" dirty="0">
+                <a:effectLst/>
+                <a:latin typeface="Calibri" panose="020F0502020204030204" pitchFamily="34" charset="0"/>
+                <a:ea typeface="Calibri" panose="020F0502020204030204" pitchFamily="34" charset="0"/>
+              </a:rPr>
+              <a:t>Where: Computer Science Building room 130</a:t>
+            </a:r>
+          </a:p>
+          <a:p>
+            <a:pPr marL="0" marR="0">
+              <a:spcBef>
+                <a:spcPts val="0"/>
+              </a:spcBef>
+              <a:spcAft>
+                <a:spcPts val="0"/>
+              </a:spcAft>
+            </a:pPr>
+            <a:r>
+              <a:rPr lang="en-US" sz="1800" dirty="0">
+                <a:effectLst/>
+                <a:latin typeface="Calibri" panose="020F0502020204030204" pitchFamily="34" charset="0"/>
+                <a:ea typeface="Calibri" panose="020F0502020204030204" pitchFamily="34" charset="0"/>
+              </a:rPr>
+              <a:t>RSVP: </a:t>
+            </a:r>
+            <a:r>
+              <a:rPr lang="en-US" sz="1800" u="sng" dirty="0">
+                <a:solidFill>
+                  <a:srgbClr val="0563C1"/>
+                </a:solidFill>
+                <a:effectLst/>
+                <a:latin typeface="Calibri" panose="020F0502020204030204" pitchFamily="34" charset="0"/>
+                <a:ea typeface="Calibri" panose="020F0502020204030204" pitchFamily="34" charset="0"/>
+                <a:hlinkClick r:id="rId2"/>
+              </a:rPr>
+              <a:t>https://forms.gle/UejirB4uDCJoRhGK9</a:t>
+            </a:r>
+            <a:endParaRPr lang="en-US" sz="1800" u="sng" dirty="0">
+              <a:solidFill>
+                <a:srgbClr val="0563C1"/>
+              </a:solidFill>
+              <a:effectLst/>
+              <a:latin typeface="Calibri" panose="020F0502020204030204" pitchFamily="34" charset="0"/>
+              <a:ea typeface="Calibri" panose="020F0502020204030204" pitchFamily="34" charset="0"/>
+            </a:endParaRPr>
+          </a:p>
+          <a:p>
+            <a:pPr marL="0" marR="0">
+              <a:spcBef>
+                <a:spcPts val="0"/>
+              </a:spcBef>
+              <a:spcAft>
+                <a:spcPts val="0"/>
+              </a:spcAft>
+            </a:pPr>
+            <a:endParaRPr lang="en-US" sz="1800" dirty="0">
+              <a:effectLst/>
+              <a:latin typeface="Calibri" panose="020F0502020204030204" pitchFamily="34" charset="0"/>
+              <a:ea typeface="Calibri" panose="020F0502020204030204" pitchFamily="34" charset="0"/>
+            </a:endParaRPr>
+          </a:p>
+          <a:p>
+            <a:pPr marL="0" marR="0">
+              <a:spcBef>
+                <a:spcPts val="0"/>
+              </a:spcBef>
+              <a:spcAft>
+                <a:spcPts val="0"/>
+              </a:spcAft>
+            </a:pPr>
+            <a:r>
+              <a:rPr lang="en-US" sz="1800" dirty="0">
+                <a:latin typeface="Calibri" panose="020F0502020204030204" pitchFamily="34" charset="0"/>
+                <a:ea typeface="Calibri" panose="020F0502020204030204" pitchFamily="34" charset="0"/>
+              </a:rPr>
+              <a:t>ACM-W – No meeting, officer meeting only (but others welcome – so ask if interested! ) </a:t>
+            </a:r>
+            <a:endParaRPr lang="en-US" sz="1800" dirty="0">
+              <a:effectLst/>
+              <a:latin typeface="Calibri" panose="020F0502020204030204" pitchFamily="34" charset="0"/>
+              <a:ea typeface="Calibri" panose="020F0502020204030204" pitchFamily="34" charset="0"/>
+            </a:endParaRPr>
+          </a:p>
+        </p:txBody>
+      </p:sp>
+      <p:sp>
+        <p:nvSpPr>
+          <p:cNvPr id="10" name="TextBox 9">
+            <a:extLst>
+              <a:ext uri="{FF2B5EF4-FFF2-40B4-BE49-F238E27FC236}">
+                <a16:creationId xmlns:a16="http://schemas.microsoft.com/office/drawing/2014/main" id="{04687C0F-3162-FD47-BF00-761D96A9475E}"/>
+              </a:ext>
+            </a:extLst>
+          </p:cNvPr>
+          <p:cNvSpPr txBox="1"/>
+          <p:nvPr/>
+        </p:nvSpPr>
+        <p:spPr>
+          <a:xfrm>
+            <a:off x="5802489" y="174561"/>
+            <a:ext cx="7880153" cy="1938992"/>
+          </a:xfrm>
+          <a:prstGeom prst="rect">
+            <a:avLst/>
+          </a:prstGeom>
+          <a:solidFill>
+            <a:schemeClr val="accent2"/>
+          </a:solidFill>
+        </p:spPr>
+        <p:txBody>
+          <a:bodyPr wrap="square" rtlCol="0">
+            <a:spAutoFit/>
+          </a:bodyPr>
+          <a:lstStyle/>
+          <a:p>
+            <a:r>
+              <a:rPr lang="en-US" b="1" dirty="0"/>
+              <a:t>Opening Question</a:t>
+            </a:r>
+          </a:p>
+          <a:p>
+            <a:r>
+              <a:rPr lang="en-US" dirty="0"/>
+              <a:t>Are there any habits you have developed over the past 4 weeks that you want to improve / change going into the rest of the semester?</a:t>
+            </a:r>
+          </a:p>
+          <a:p>
+            <a:endParaRPr lang="en-US" dirty="0"/>
+          </a:p>
+          <a:p>
+            <a:r>
+              <a:rPr lang="en-US" dirty="0"/>
+              <a:t>How are you going to hold yourself accountable to building better habits?</a:t>
+            </a:r>
+          </a:p>
+        </p:txBody>
+      </p:sp>
+      <p:sp>
+        <p:nvSpPr>
+          <p:cNvPr id="8" name="Text Placeholder 4">
+            <a:extLst>
+              <a:ext uri="{FF2B5EF4-FFF2-40B4-BE49-F238E27FC236}">
+                <a16:creationId xmlns:a16="http://schemas.microsoft.com/office/drawing/2014/main" id="{85ED3DE7-849C-6A4D-8F0B-681286F91A4C}"/>
+              </a:ext>
+            </a:extLst>
+          </p:cNvPr>
+          <p:cNvSpPr txBox="1">
+            <a:spLocks/>
+          </p:cNvSpPr>
+          <p:nvPr/>
+        </p:nvSpPr>
+        <p:spPr>
+          <a:xfrm>
+            <a:off x="431800" y="1765842"/>
+            <a:ext cx="7531100" cy="5400517"/>
+          </a:xfrm>
+          <a:prstGeom prst="rect">
+            <a:avLst/>
+          </a:prstGeom>
+        </p:spPr>
+        <p:txBody>
+          <a:bodyPr vert="horz" wrap="square" lIns="91440" tIns="91440" rIns="91440" bIns="91440" rtlCol="0">
+            <a:spAutoFit/>
+          </a:bodyPr>
+          <a:lstStyle>
+            <a:lvl1pPr marL="524712" indent="-524712" algn="l" defTabSz="699614" rtl="0" eaLnBrk="1" latinLnBrk="0" hangingPunct="1">
+              <a:lnSpc>
+                <a:spcPct val="120000"/>
+              </a:lnSpc>
+              <a:spcBef>
+                <a:spcPts val="600"/>
+              </a:spcBef>
+              <a:spcAft>
+                <a:spcPts val="600"/>
+              </a:spcAft>
+              <a:buFont typeface="Arial"/>
+              <a:buChar char="•"/>
+              <a:defRPr sz="1800" b="0" i="0" kern="1200">
+                <a:solidFill>
+                  <a:srgbClr val="092529"/>
+                </a:solidFill>
+                <a:latin typeface="Proxima Nova" charset="0"/>
+                <a:ea typeface="Proxima Nova" charset="0"/>
+                <a:cs typeface="Proxima Nova" charset="0"/>
+              </a:defRPr>
+            </a:lvl1pPr>
+            <a:lvl2pPr marL="1136875" indent="-437261" algn="l" defTabSz="699614" rtl="0" eaLnBrk="1" latinLnBrk="0" hangingPunct="1">
+              <a:lnSpc>
+                <a:spcPct val="120000"/>
+              </a:lnSpc>
+              <a:spcBef>
+                <a:spcPts val="0"/>
+              </a:spcBef>
+              <a:spcAft>
+                <a:spcPts val="600"/>
+              </a:spcAft>
+              <a:buFont typeface="Arial"/>
+              <a:buChar char="–"/>
+              <a:defRPr sz="1600" b="0" i="0" kern="1200">
+                <a:solidFill>
+                  <a:srgbClr val="092529"/>
+                </a:solidFill>
+                <a:latin typeface="Proxima Nova" charset="0"/>
+                <a:ea typeface="Proxima Nova" charset="0"/>
+                <a:cs typeface="Proxima Nova" charset="0"/>
+              </a:defRPr>
+            </a:lvl2pPr>
+            <a:lvl3pPr marL="1749040" indent="-349807" algn="l" defTabSz="699614" rtl="0" eaLnBrk="1" latinLnBrk="0" hangingPunct="1">
+              <a:lnSpc>
+                <a:spcPct val="120000"/>
+              </a:lnSpc>
+              <a:spcBef>
+                <a:spcPts val="0"/>
+              </a:spcBef>
+              <a:spcAft>
+                <a:spcPts val="600"/>
+              </a:spcAft>
+              <a:buFont typeface="Arial"/>
+              <a:buChar char="•"/>
+              <a:defRPr sz="1600" b="0" i="0" kern="1200">
+                <a:solidFill>
+                  <a:srgbClr val="092529"/>
+                </a:solidFill>
+                <a:latin typeface="Proxima Nova" charset="0"/>
+                <a:ea typeface="Proxima Nova" charset="0"/>
+                <a:cs typeface="Proxima Nova" charset="0"/>
+              </a:defRPr>
+            </a:lvl3pPr>
+            <a:lvl4pPr marL="2448655" indent="-349807" algn="l" defTabSz="699614" rtl="0" eaLnBrk="1" latinLnBrk="0" hangingPunct="1">
+              <a:lnSpc>
+                <a:spcPct val="120000"/>
+              </a:lnSpc>
+              <a:spcBef>
+                <a:spcPts val="0"/>
+              </a:spcBef>
+              <a:spcAft>
+                <a:spcPts val="600"/>
+              </a:spcAft>
+              <a:buFont typeface="Arial"/>
+              <a:buChar char="–"/>
+              <a:defRPr sz="1600" b="0" i="0" kern="1200">
+                <a:solidFill>
+                  <a:srgbClr val="092529"/>
+                </a:solidFill>
+                <a:latin typeface="Proxima Nova" charset="0"/>
+                <a:ea typeface="Proxima Nova" charset="0"/>
+                <a:cs typeface="Proxima Nova" charset="0"/>
+              </a:defRPr>
+            </a:lvl4pPr>
+            <a:lvl5pPr marL="3148272" indent="-349807" algn="l" defTabSz="699614" rtl="0" eaLnBrk="1" latinLnBrk="0" hangingPunct="1">
+              <a:spcBef>
+                <a:spcPct val="20000"/>
+              </a:spcBef>
+              <a:buFont typeface="Arial"/>
+              <a:buChar char="»"/>
+              <a:defRPr sz="1648" b="0" kern="1200">
+                <a:solidFill>
+                  <a:srgbClr val="092529"/>
+                </a:solidFill>
+                <a:latin typeface="Franklin Gothic Book" charset="0"/>
+                <a:ea typeface="Franklin Gothic Book" charset="0"/>
+                <a:cs typeface="Franklin Gothic Book" charset="0"/>
+              </a:defRPr>
+            </a:lvl5pPr>
+            <a:lvl6pPr marL="3847888" indent="-349807" algn="l" defTabSz="699614" rtl="0" eaLnBrk="1" latinLnBrk="0" hangingPunct="1">
+              <a:spcBef>
+                <a:spcPct val="20000"/>
+              </a:spcBef>
+              <a:buFont typeface="Arial"/>
+              <a:buChar char="•"/>
+              <a:defRPr sz="3022" kern="1200">
+                <a:solidFill>
+                  <a:schemeClr val="tx1"/>
+                </a:solidFill>
+                <a:latin typeface="+mn-lt"/>
+                <a:ea typeface="+mn-ea"/>
+                <a:cs typeface="+mn-cs"/>
+              </a:defRPr>
+            </a:lvl6pPr>
+            <a:lvl7pPr marL="4547505" indent="-349807" algn="l" defTabSz="699614" rtl="0" eaLnBrk="1" latinLnBrk="0" hangingPunct="1">
+              <a:spcBef>
+                <a:spcPct val="20000"/>
+              </a:spcBef>
+              <a:buFont typeface="Arial"/>
+              <a:buChar char="•"/>
+              <a:defRPr sz="3022" kern="1200">
+                <a:solidFill>
+                  <a:schemeClr val="tx1"/>
+                </a:solidFill>
+                <a:latin typeface="+mn-lt"/>
+                <a:ea typeface="+mn-ea"/>
+                <a:cs typeface="+mn-cs"/>
+              </a:defRPr>
+            </a:lvl7pPr>
+            <a:lvl8pPr marL="5247119" indent="-349807" algn="l" defTabSz="699614" rtl="0" eaLnBrk="1" latinLnBrk="0" hangingPunct="1">
+              <a:spcBef>
+                <a:spcPct val="20000"/>
+              </a:spcBef>
+              <a:buFont typeface="Arial"/>
+              <a:buChar char="•"/>
+              <a:defRPr sz="3022" kern="1200">
+                <a:solidFill>
+                  <a:schemeClr val="tx1"/>
+                </a:solidFill>
+                <a:latin typeface="+mn-lt"/>
+                <a:ea typeface="+mn-ea"/>
+                <a:cs typeface="+mn-cs"/>
+              </a:defRPr>
+            </a:lvl8pPr>
+            <a:lvl9pPr marL="5946736" indent="-349807" algn="l" defTabSz="699614" rtl="0" eaLnBrk="1" latinLnBrk="0" hangingPunct="1">
+              <a:spcBef>
+                <a:spcPct val="20000"/>
+              </a:spcBef>
+              <a:buFont typeface="Arial"/>
+              <a:buChar char="•"/>
+              <a:defRPr sz="3022" kern="1200">
+                <a:solidFill>
+                  <a:schemeClr val="tx1"/>
+                </a:solidFill>
+                <a:latin typeface="+mn-lt"/>
+                <a:ea typeface="+mn-ea"/>
+                <a:cs typeface="+mn-cs"/>
+              </a:defRPr>
+            </a:lvl9pPr>
+          </a:lstStyle>
+          <a:p>
+            <a:r>
+              <a:rPr lang="en-US" dirty="0"/>
+              <a:t>Labs – back to two this week</a:t>
+            </a:r>
+          </a:p>
+          <a:p>
+            <a:pPr lvl="1"/>
+            <a:r>
+              <a:rPr lang="en-US" dirty="0"/>
+              <a:t>Takes more time to look through them!</a:t>
+            </a:r>
+          </a:p>
+          <a:p>
+            <a:pPr lvl="1"/>
+            <a:r>
+              <a:rPr lang="en-US" dirty="0"/>
+              <a:t>Try to plan them out – before – you write them!</a:t>
+            </a:r>
+          </a:p>
+          <a:p>
+            <a:r>
+              <a:rPr lang="en-US" dirty="0"/>
+              <a:t>Tips for being successful in this course</a:t>
+            </a:r>
+          </a:p>
+          <a:p>
+            <a:pPr lvl="1"/>
+            <a:r>
+              <a:rPr lang="en-US" dirty="0"/>
+              <a:t>Do the readings (just participation) before *every* lecture</a:t>
+            </a:r>
+          </a:p>
+          <a:p>
+            <a:pPr lvl="1"/>
+            <a:r>
+              <a:rPr lang="en-US" dirty="0"/>
+              <a:t>Look at the labs / even try it, the night before lab!</a:t>
+            </a:r>
+          </a:p>
+          <a:p>
+            <a:pPr lvl="2"/>
+            <a:r>
+              <a:rPr lang="en-US" dirty="0"/>
+              <a:t>Helps to know what questions to ask</a:t>
+            </a:r>
+          </a:p>
+          <a:p>
+            <a:pPr lvl="2"/>
+            <a:r>
+              <a:rPr lang="en-US" dirty="0"/>
+              <a:t>Plan out what you want to do before you write it</a:t>
+            </a:r>
+          </a:p>
+          <a:p>
+            <a:pPr lvl="1"/>
+            <a:r>
+              <a:rPr lang="en-US" dirty="0"/>
+              <a:t>3-4 nights a week – Knowledge Check (go back!)</a:t>
+            </a:r>
+          </a:p>
+          <a:p>
+            <a:pPr lvl="2"/>
+            <a:r>
+              <a:rPr lang="en-US" dirty="0"/>
+              <a:t>Practiced recall, spaced over time is the best way to study, no matter the field!</a:t>
+            </a:r>
+          </a:p>
+          <a:p>
+            <a:pPr lvl="2"/>
+            <a:r>
+              <a:rPr lang="en-US" dirty="0"/>
+              <a:t>Provide example code while learning how to work on it</a:t>
+            </a:r>
+          </a:p>
+          <a:p>
+            <a:pPr lvl="2"/>
+            <a:r>
+              <a:rPr lang="en-US" dirty="0"/>
+              <a:t>Spend no more than 20 minutes on this – ask for help in </a:t>
+            </a:r>
+            <a:r>
+              <a:rPr lang="en-US" b="1" dirty="0"/>
+              <a:t>general</a:t>
+            </a:r>
+            <a:r>
+              <a:rPr lang="en-US" dirty="0"/>
+              <a:t> if stuck!  (post the knowledge check and ask)</a:t>
+            </a:r>
+          </a:p>
+        </p:txBody>
+      </p:sp>
+    </p:spTree>
+    <p:extLst>
+      <p:ext uri="{BB962C8B-B14F-4D97-AF65-F5344CB8AC3E}">
+        <p14:creationId xmlns:p14="http://schemas.microsoft.com/office/powerpoint/2010/main" val="3989986971"/>
+      </p:ext>
+    </p:extLst>
+  </p:cSld>
+  <p:clrMapOvr>
+    <a:masterClrMapping/>
+  </p:clrMapOvr>
+  <mc:AlternateContent xmlns:mc="http://schemas.openxmlformats.org/markup-compatibility/2006" xmlns:p14="http://schemas.microsoft.com/office/powerpoint/2010/main">
+    <mc:Choice Requires="p14">
+      <p:transition p14:dur="300">
+        <p:fade/>
+      </p:transition>
+    </mc:Choice>
+    <mc:Fallback xmlns="">
+      <p:transition>
+        <p:fade/>
+      </p:transition>
+    </mc:Fallback>
+  </mc:AlternateContent>
+</p:sld>
+</file>
+
+<file path=ppt/slides/slide3.xml><?xml version="1.0" encoding="utf-8"?>
 <p:sld xmlns:a="http://schemas.openxmlformats.org/drawingml/2006/main" xmlns:r="http://schemas.openxmlformats.org/officeDocument/2006/relationships" xmlns:p="http://schemas.openxmlformats.org/presentationml/2006/main">
   <p:cSld>
     <p:spTree>
@@ -10885,7 +11737,7 @@
               <a:buChar char="●"/>
             </a:pPr>
             <a:r>
-              <a:rPr lang="en"/>
+              <a:rPr lang="en" dirty="0"/>
               <a:t>Programmers have</a:t>
             </a:r>
             <a:endParaRPr dirty="0"/>
@@ -10898,7 +11750,7 @@
               <a:buChar char="○"/>
             </a:pPr>
             <a:r>
-              <a:rPr lang="en"/>
+              <a:rPr lang="en" dirty="0"/>
               <a:t>Phenomenal ability to influence society</a:t>
             </a:r>
             <a:endParaRPr dirty="0"/>
@@ -10911,15 +11763,15 @@
               <a:buChar char="■"/>
             </a:pPr>
             <a:r>
-              <a:rPr lang="en"/>
+              <a:rPr lang="en" dirty="0"/>
               <a:t>Especially in a </a:t>
             </a:r>
             <a:r>
-              <a:rPr lang="en" b="1"/>
+              <a:rPr lang="en" b="1" dirty="0"/>
               <a:t>content delivery</a:t>
             </a:r>
             <a:r>
-              <a:rPr lang="en"/>
+              <a:rPr lang="en" dirty="0"/>
               <a:t> society</a:t>
             </a:r>
             <a:endParaRPr dirty="0"/>
@@ -10932,7 +11784,7 @@
               <a:buChar char="○"/>
             </a:pPr>
             <a:r>
-              <a:rPr lang="en"/>
+              <a:rPr lang="en" dirty="0"/>
               <a:t>Influence groups they never expected</a:t>
             </a:r>
             <a:endParaRPr dirty="0"/>
@@ -10945,7 +11797,7 @@
               <a:buChar char="■"/>
             </a:pPr>
             <a:r>
-              <a:rPr lang="en"/>
+              <a:rPr lang="en" dirty="0"/>
               <a:t>World wide audience</a:t>
             </a:r>
             <a:endParaRPr dirty="0"/>
@@ -10958,7 +11810,7 @@
               <a:buChar char="○"/>
             </a:pPr>
             <a:r>
-              <a:rPr lang="en"/>
+              <a:rPr lang="en" dirty="0"/>
               <a:t>This power often is unintentional </a:t>
             </a:r>
             <a:endParaRPr dirty="0"/>
@@ -10971,11 +11823,11 @@
               <a:buChar char="■"/>
             </a:pPr>
             <a:r>
-              <a:rPr lang="en"/>
+              <a:rPr lang="en" dirty="0"/>
               <a:t>First law of technology: </a:t>
             </a:r>
             <a:r>
-              <a:rPr lang="en" b="1"/>
+              <a:rPr lang="en" b="1" dirty="0"/>
               <a:t>Technology is neither good nor bad; nor is it neutral.</a:t>
             </a:r>
             <a:endParaRPr b="1" dirty="0"/>
@@ -10991,19 +11843,19 @@
               <a:buChar char="●"/>
             </a:pPr>
             <a:r>
-              <a:rPr lang="en"/>
+              <a:rPr lang="en" dirty="0"/>
               <a:t>Ethical Question - </a:t>
             </a:r>
             <a:r>
-              <a:rPr lang="en" i="1"/>
+              <a:rPr lang="en" i="1" dirty="0"/>
               <a:t>Can</a:t>
             </a:r>
             <a:r>
-              <a:rPr lang="en"/>
+              <a:rPr lang="en" dirty="0"/>
               <a:t> </a:t>
             </a:r>
             <a:r>
-              <a:rPr lang="en" i="1"/>
+              <a:rPr lang="en" i="1" dirty="0"/>
               <a:t>Technology fully meet a group’s needs or preferences, if members who identify with that group are not part of the creation of that technology?</a:t>
             </a:r>
             <a:endParaRPr i="1" dirty="0"/>
@@ -11016,7 +11868,7 @@
               <a:buChar char="■"/>
             </a:pPr>
             <a:r>
-              <a:rPr lang="en"/>
+              <a:rPr lang="en" dirty="0"/>
               <a:t>Airbags are a famous example of failure</a:t>
             </a:r>
             <a:endParaRPr dirty="0"/>
@@ -11031,7 +11883,7 @@
 </p:sld>
 </file>
 
-<file path=ppt/slides/slide3.xml><?xml version="1.0" encoding="utf-8"?>
+<file path=ppt/slides/slide4.xml><?xml version="1.0" encoding="utf-8"?>
 <p:sld xmlns:a="http://schemas.openxmlformats.org/drawingml/2006/main" xmlns:r="http://schemas.openxmlformats.org/officeDocument/2006/relationships" xmlns:p="http://schemas.openxmlformats.org/presentationml/2006/main">
   <p:cSld>
     <p:spTree>
@@ -11266,7 +12118,7 @@
 </p:sld>
 </file>
 
-<file path=ppt/slides/slide4.xml><?xml version="1.0" encoding="utf-8"?>
+<file path=ppt/slides/slide5.xml><?xml version="1.0" encoding="utf-8"?>
 <p:sld xmlns:a="http://schemas.openxmlformats.org/drawingml/2006/main" xmlns:r="http://schemas.openxmlformats.org/officeDocument/2006/relationships" xmlns:p="http://schemas.openxmlformats.org/presentationml/2006/main">
   <p:cSld>
     <p:spTree>
@@ -11580,7 +12432,7 @@
 </p:sld>
 </file>
 
-<file path=ppt/slides/slide5.xml><?xml version="1.0" encoding="utf-8"?>
+<file path=ppt/slides/slide6.xml><?xml version="1.0" encoding="utf-8"?>
 <p:sld xmlns:a="http://schemas.openxmlformats.org/drawingml/2006/main" xmlns:r="http://schemas.openxmlformats.org/officeDocument/2006/relationships" xmlns:p="http://schemas.openxmlformats.org/presentationml/2006/main">
   <p:cSld>
     <p:spTree>
@@ -11687,7 +12539,7 @@
 </p:sld>
 </file>
 
-<file path=ppt/slides/slide6.xml><?xml version="1.0" encoding="utf-8"?>
+<file path=ppt/slides/slide7.xml><?xml version="1.0" encoding="utf-8"?>
 <p:sld xmlns:a="http://schemas.openxmlformats.org/drawingml/2006/main" xmlns:r="http://schemas.openxmlformats.org/officeDocument/2006/relationships" xmlns:p="http://schemas.openxmlformats.org/presentationml/2006/main">
   <p:cSld>
     <p:spTree>
@@ -11806,7 +12658,7 @@
 </p:sld>
 </file>
 
-<file path=ppt/slides/slide7.xml><?xml version="1.0" encoding="utf-8"?>
+<file path=ppt/slides/slide8.xml><?xml version="1.0" encoding="utf-8"?>
 <p:sld xmlns:a="http://schemas.openxmlformats.org/drawingml/2006/main" xmlns:r="http://schemas.openxmlformats.org/officeDocument/2006/relationships" xmlns:p="http://schemas.openxmlformats.org/presentationml/2006/main">
   <p:cSld>
     <p:spTree>
@@ -12305,7 +13157,7 @@
 </p:sld>
 </file>
 
-<file path=ppt/slides/slide8.xml><?xml version="1.0" encoding="utf-8"?>
+<file path=ppt/slides/slide9.xml><?xml version="1.0" encoding="utf-8"?>
 <p:sld xmlns:a="http://schemas.openxmlformats.org/drawingml/2006/main" xmlns:r="http://schemas.openxmlformats.org/officeDocument/2006/relationships" xmlns:p="http://schemas.openxmlformats.org/presentationml/2006/main">
   <p:cSld>
     <p:spTree>
@@ -12384,7 +13236,7 @@
           <a:p>
             <a:r>
               <a:rPr lang="en-US" dirty="0"/>
-              <a:t>5 **  2  is commonly written as  5</a:t>
+              <a:t>5 ** 2  is commonly written as  5</a:t>
             </a:r>
             <a:r>
               <a:rPr lang="en-US" baseline="30000" dirty="0"/>
@@ -12475,7 +13327,7 @@
                 <a:latin typeface="Consolas" panose="020B0609020204030204" pitchFamily="49" charset="0"/>
                 <a:cs typeface="Consolas" panose="020B0609020204030204" pitchFamily="49" charset="0"/>
               </a:rPr>
-              <a:t>) #prints 2 </a:t>
+              <a:t>) #prints 25 </a:t>
             </a:r>
           </a:p>
           <a:p>
@@ -12833,7 +13685,7 @@
                 <a:latin typeface="Consolas" panose="020B0609020204030204" pitchFamily="49" charset="0"/>
                 <a:cs typeface="Consolas" panose="020B0609020204030204" pitchFamily="49" charset="0"/>
               </a:rPr>
-              <a:t>) # prints 2</a:t>
+              <a:t>) # prints 2.0</a:t>
             </a:r>
           </a:p>
           <a:p>
@@ -12846,7 +13698,15 @@
             <a:pPr lvl="1"/>
             <a:r>
               <a:rPr lang="en-US" dirty="0"/>
-              <a:t>Unlike int(), keeps float type, less cost</a:t>
+              <a:t>Floor and truncation are </a:t>
+            </a:r>
+            <a:r>
+              <a:rPr lang="en-US" i="1" dirty="0"/>
+              <a:t>slightly</a:t>
+            </a:r>
+            <a:r>
+              <a:rPr lang="en-US" dirty="0"/>
+              <a:t> different</a:t>
             </a:r>
           </a:p>
           <a:p>
@@ -12862,7 +13722,7 @@
                 <a:latin typeface="Consolas" panose="020B0609020204030204" pitchFamily="49" charset="0"/>
                 <a:cs typeface="Consolas" panose="020B0609020204030204" pitchFamily="49" charset="0"/>
               </a:rPr>
-              <a:t>  = </a:t>
+              <a:t>  = -</a:t>
             </a:r>
             <a:r>
               <a:rPr lang="en-US" dirty="0">
@@ -12929,7 +13789,7 @@
                 <a:latin typeface="Consolas" panose="020B0609020204030204" pitchFamily="49" charset="0"/>
                 <a:cs typeface="Consolas" panose="020B0609020204030204" pitchFamily="49" charset="0"/>
               </a:rPr>
-              <a:t>)  # prints 2.0</a:t>
+              <a:t>)  # prints -3.0</a:t>
             </a:r>
           </a:p>
         </p:txBody>
@@ -12947,297 +13807,6 @@
   <p:transition>
     <p:fade/>
   </p:transition>
-</p:sld>
-</file>
-
-<file path=ppt/slides/slide9.xml><?xml version="1.0" encoding="utf-8"?>
-<p:sld xmlns:a="http://schemas.openxmlformats.org/drawingml/2006/main" xmlns:r="http://schemas.openxmlformats.org/officeDocument/2006/relationships" xmlns:p="http://schemas.openxmlformats.org/presentationml/2006/main">
-  <p:cSld>
-    <p:spTree>
-      <p:nvGrpSpPr>
-        <p:cNvPr id="1" name="Shape 212"/>
-        <p:cNvGrpSpPr/>
-        <p:nvPr/>
-      </p:nvGrpSpPr>
-      <p:grpSpPr>
-        <a:xfrm>
-          <a:off x="0" y="0"/>
-          <a:ext cx="0" cy="0"/>
-          <a:chOff x="0" y="0"/>
-          <a:chExt cx="0" cy="0"/>
-        </a:xfrm>
-      </p:grpSpPr>
-      <p:sp>
-        <p:nvSpPr>
-          <p:cNvPr id="213" name="Google Shape;213;p43"/>
-          <p:cNvSpPr txBox="1">
-            <a:spLocks noGrp="1"/>
-          </p:cNvSpPr>
-          <p:nvPr>
-            <p:ph type="title"/>
-          </p:nvPr>
-        </p:nvSpPr>
-        <p:spPr>
-          <a:xfrm>
-            <a:off x="628075" y="751389"/>
-            <a:ext cx="12561413" cy="1015467"/>
-          </a:xfrm>
-          <a:prstGeom prst="rect">
-            <a:avLst/>
-          </a:prstGeom>
-        </p:spPr>
-        <p:txBody>
-          <a:bodyPr spcFirstLastPara="1" vert="horz" wrap="square" lIns="91422" tIns="91422" rIns="91422" bIns="91422" rtlCol="0" anchor="b" anchorCtr="0">
-            <a:noAutofit/>
-          </a:bodyPr>
-          <a:lstStyle/>
-          <a:p>
-            <a:r>
-              <a:rPr lang="en" dirty="0"/>
-              <a:t>Modulo  - Extremely useful operation</a:t>
-            </a:r>
-            <a:endParaRPr dirty="0"/>
-          </a:p>
-        </p:txBody>
-      </p:sp>
-      <p:sp>
-        <p:nvSpPr>
-          <p:cNvPr id="214" name="Google Shape;214;p43"/>
-          <p:cNvSpPr txBox="1">
-            <a:spLocks noGrp="1"/>
-          </p:cNvSpPr>
-          <p:nvPr>
-            <p:ph type="body" idx="1"/>
-          </p:nvPr>
-        </p:nvSpPr>
-        <p:spPr>
-          <a:xfrm>
-            <a:off x="628075" y="1920725"/>
-            <a:ext cx="12561413" cy="2015520"/>
-          </a:xfrm>
-          <a:prstGeom prst="rect">
-            <a:avLst/>
-          </a:prstGeom>
-        </p:spPr>
-        <p:txBody>
-          <a:bodyPr spcFirstLastPara="1" vert="horz" wrap="square" lIns="91422" tIns="91422" rIns="91422" bIns="91422" rtlCol="0" anchor="t" anchorCtr="0">
-            <a:noAutofit/>
-          </a:bodyPr>
-          <a:lstStyle/>
-          <a:p>
-            <a:pPr marL="0" indent="0">
-              <a:buNone/>
-            </a:pPr>
-            <a:r>
-              <a:rPr lang="en"/>
-              <a:t>% - it is the remainder of a division statement?</a:t>
-            </a:r>
-            <a:endParaRPr dirty="0"/>
-          </a:p>
-          <a:p>
-            <a:pPr marL="0" indent="0">
-              <a:spcAft>
-                <a:spcPts val="604"/>
-              </a:spcAft>
-              <a:buNone/>
-            </a:pPr>
-            <a:endParaRPr dirty="0"/>
-          </a:p>
-        </p:txBody>
-      </p:sp>
-      <p:pic>
-        <p:nvPicPr>
-          <p:cNvPr id="215" name="Google Shape;215;p43"/>
-          <p:cNvPicPr preferRelativeResize="0"/>
-          <p:nvPr/>
-        </p:nvPicPr>
-        <p:blipFill>
-          <a:blip r:embed="rId3">
-            <a:alphaModFix/>
-          </a:blip>
-          <a:stretch>
-            <a:fillRect/>
-          </a:stretch>
-        </p:blipFill>
-        <p:spPr>
-          <a:xfrm>
-            <a:off x="862769" y="3004947"/>
-            <a:ext cx="3744545" cy="2808409"/>
-          </a:xfrm>
-          <a:prstGeom prst="rect">
-            <a:avLst/>
-          </a:prstGeom>
-          <a:noFill/>
-          <a:ln>
-            <a:noFill/>
-          </a:ln>
-        </p:spPr>
-      </p:pic>
-      <p:sp>
-        <p:nvSpPr>
-          <p:cNvPr id="216" name="Google Shape;216;p43"/>
-          <p:cNvSpPr txBox="1">
-            <a:spLocks noGrp="1"/>
-          </p:cNvSpPr>
-          <p:nvPr>
-            <p:ph type="body" idx="1"/>
-          </p:nvPr>
-        </p:nvSpPr>
-        <p:spPr>
-          <a:xfrm>
-            <a:off x="4607314" y="2868617"/>
-            <a:ext cx="6497627" cy="2926267"/>
-          </a:xfrm>
-          <a:prstGeom prst="rect">
-            <a:avLst/>
-          </a:prstGeom>
-        </p:spPr>
-        <p:txBody>
-          <a:bodyPr spcFirstLastPara="1" vert="horz" wrap="square" lIns="91422" tIns="91422" rIns="91422" bIns="91422" rtlCol="0" anchor="t" anchorCtr="0">
-            <a:noAutofit/>
-          </a:bodyPr>
-          <a:lstStyle/>
-          <a:p>
-            <a:r>
-              <a:rPr lang="en" dirty="0"/>
-              <a:t>Always return the remainder</a:t>
-            </a:r>
-            <a:endParaRPr dirty="0"/>
-          </a:p>
-          <a:p>
-            <a:pPr>
-              <a:spcBef>
-                <a:spcPts val="0"/>
-              </a:spcBef>
-            </a:pPr>
-            <a:r>
-              <a:rPr lang="en" dirty="0"/>
-              <a:t>So </a:t>
-            </a:r>
-            <a:endParaRPr dirty="0"/>
-          </a:p>
-          <a:p>
-            <a:pPr lvl="1">
-              <a:spcBef>
-                <a:spcPts val="0"/>
-              </a:spcBef>
-            </a:pPr>
-            <a:r>
-              <a:rPr lang="en" dirty="0">
-                <a:latin typeface="Consolas" panose="020B0609020204030204" pitchFamily="49" charset="0"/>
-                <a:cs typeface="Consolas" panose="020B0609020204030204" pitchFamily="49" charset="0"/>
-              </a:rPr>
-              <a:t>x = 250 % 6</a:t>
-            </a:r>
-            <a:endParaRPr dirty="0">
-              <a:latin typeface="Consolas" panose="020B0609020204030204" pitchFamily="49" charset="0"/>
-              <a:cs typeface="Consolas" panose="020B0609020204030204" pitchFamily="49" charset="0"/>
-            </a:endParaRPr>
-          </a:p>
-          <a:p>
-            <a:pPr lvl="1">
-              <a:spcBef>
-                <a:spcPts val="0"/>
-              </a:spcBef>
-            </a:pPr>
-            <a:r>
-              <a:rPr lang="en" dirty="0"/>
-              <a:t>x would be </a:t>
-            </a:r>
-            <a:r>
-              <a:rPr lang="en" b="1" dirty="0"/>
-              <a:t>4</a:t>
-            </a:r>
-            <a:endParaRPr dirty="0"/>
-          </a:p>
-          <a:p>
-            <a:pPr lvl="1">
-              <a:spcBef>
-                <a:spcPts val="0"/>
-              </a:spcBef>
-            </a:pPr>
-            <a:r>
-              <a:rPr lang="en" dirty="0"/>
-              <a:t>So combining them</a:t>
-            </a:r>
-            <a:endParaRPr dirty="0"/>
-          </a:p>
-          <a:p>
-            <a:pPr lvl="2">
-              <a:spcBef>
-                <a:spcPts val="0"/>
-              </a:spcBef>
-            </a:pPr>
-            <a:r>
-              <a:rPr lang="en" dirty="0">
-                <a:latin typeface="Consolas" panose="020B0609020204030204" pitchFamily="49" charset="0"/>
-                <a:cs typeface="Consolas" panose="020B0609020204030204" pitchFamily="49" charset="0"/>
-              </a:rPr>
-              <a:t>whole = 250 // 6</a:t>
-            </a:r>
-            <a:endParaRPr dirty="0">
-              <a:latin typeface="Consolas" panose="020B0609020204030204" pitchFamily="49" charset="0"/>
-              <a:cs typeface="Consolas" panose="020B0609020204030204" pitchFamily="49" charset="0"/>
-            </a:endParaRPr>
-          </a:p>
-          <a:p>
-            <a:pPr lvl="2">
-              <a:spcBef>
-                <a:spcPts val="0"/>
-              </a:spcBef>
-            </a:pPr>
-            <a:r>
-              <a:rPr lang="en" dirty="0">
-                <a:latin typeface="Consolas" panose="020B0609020204030204" pitchFamily="49" charset="0"/>
-                <a:cs typeface="Consolas" panose="020B0609020204030204" pitchFamily="49" charset="0"/>
-              </a:rPr>
-              <a:t>remainder = 250 % 6</a:t>
-            </a:r>
-            <a:endParaRPr dirty="0">
-              <a:latin typeface="Consolas" panose="020B0609020204030204" pitchFamily="49" charset="0"/>
-              <a:cs typeface="Consolas" panose="020B0609020204030204" pitchFamily="49" charset="0"/>
-            </a:endParaRPr>
-          </a:p>
-          <a:p>
-            <a:pPr lvl="2">
-              <a:spcBef>
-                <a:spcPts val="0"/>
-              </a:spcBef>
-            </a:pPr>
-            <a:r>
-              <a:rPr lang="en" dirty="0"/>
-              <a:t>whole = 41</a:t>
-            </a:r>
-            <a:endParaRPr dirty="0"/>
-          </a:p>
-          <a:p>
-            <a:pPr lvl="2">
-              <a:spcBef>
-                <a:spcPts val="0"/>
-              </a:spcBef>
-            </a:pPr>
-            <a:r>
-              <a:rPr lang="en" dirty="0"/>
-              <a:t>remainder = 4</a:t>
-            </a:r>
-            <a:endParaRPr dirty="0"/>
-          </a:p>
-          <a:p>
-            <a:pPr marL="0" indent="0">
-              <a:spcAft>
-                <a:spcPts val="604"/>
-              </a:spcAft>
-              <a:buNone/>
-            </a:pPr>
-            <a:endParaRPr dirty="0"/>
-          </a:p>
-        </p:txBody>
-      </p:sp>
-    </p:spTree>
-  </p:cSld>
-  <p:clrMapOvr>
-    <a:masterClrMapping/>
-  </p:clrMapOvr>
 </p:sld>
 </file>
 

</xml_diff>

<commit_message>
update for  monday's changes
</commit_message>
<xml_diff>
--- a/Slides/On-Campus/05_01_InclusiveDesignandExpressions.pptx
+++ b/Slides/On-Campus/05_01_InclusiveDesignandExpressions.pptx
@@ -228,7 +228,7 @@
           <a:p>
             <a:fld id="{4D7E51A5-B478-1E40-8CBB-0DAA8831E99D}" type="datetimeFigureOut">
               <a:rPr lang="en-US" smtClean="0"/>
-              <a:t>9/20/2021</a:t>
+              <a:t>9/21/21</a:t>
             </a:fld>
             <a:endParaRPr lang="en-US"/>
           </a:p>
@@ -393,7 +393,7 @@
           <a:p>
             <a:fld id="{D0ED587F-861E-6740-9643-E3DDAE89B8D6}" type="datetimeFigureOut">
               <a:rPr lang="en-US" smtClean="0"/>
-              <a:t>9/20/2021</a:t>
+              <a:t>9/21/21</a:t>
             </a:fld>
             <a:endParaRPr lang="en-US"/>
           </a:p>
@@ -765,6 +765,90 @@
 </file>
 
 <file path=ppt/notesSlides/notesSlide2.xml><?xml version="1.0" encoding="utf-8"?>
+<p:notes xmlns:a="http://schemas.openxmlformats.org/drawingml/2006/main" xmlns:r="http://schemas.openxmlformats.org/officeDocument/2006/relationships" xmlns:p="http://schemas.openxmlformats.org/presentationml/2006/main">
+  <p:cSld>
+    <p:spTree>
+      <p:nvGrpSpPr>
+        <p:cNvPr id="1" name=""/>
+        <p:cNvGrpSpPr/>
+        <p:nvPr/>
+      </p:nvGrpSpPr>
+      <p:grpSpPr>
+        <a:xfrm>
+          <a:off x="0" y="0"/>
+          <a:ext cx="0" cy="0"/>
+          <a:chOff x="0" y="0"/>
+          <a:chExt cx="0" cy="0"/>
+        </a:xfrm>
+      </p:grpSpPr>
+      <p:sp>
+        <p:nvSpPr>
+          <p:cNvPr id="2" name="Slide Image Placeholder 1"/>
+          <p:cNvSpPr>
+            <a:spLocks noGrp="1" noRot="1" noChangeAspect="1"/>
+          </p:cNvSpPr>
+          <p:nvPr>
+            <p:ph type="sldImg"/>
+          </p:nvPr>
+        </p:nvSpPr>
+        <p:spPr/>
+      </p:sp>
+      <p:sp>
+        <p:nvSpPr>
+          <p:cNvPr id="3" name="Notes Placeholder 2"/>
+          <p:cNvSpPr>
+            <a:spLocks noGrp="1"/>
+          </p:cNvSpPr>
+          <p:nvPr>
+            <p:ph type="body" idx="1"/>
+          </p:nvPr>
+        </p:nvSpPr>
+        <p:spPr/>
+        <p:txBody>
+          <a:bodyPr/>
+          <a:lstStyle/>
+          <a:p>
+            <a:endParaRPr lang="en-US" dirty="0"/>
+          </a:p>
+        </p:txBody>
+      </p:sp>
+      <p:sp>
+        <p:nvSpPr>
+          <p:cNvPr id="4" name="Slide Number Placeholder 3"/>
+          <p:cNvSpPr>
+            <a:spLocks noGrp="1"/>
+          </p:cNvSpPr>
+          <p:nvPr>
+            <p:ph type="sldNum" sz="quarter" idx="5"/>
+          </p:nvPr>
+        </p:nvSpPr>
+        <p:spPr/>
+        <p:txBody>
+          <a:bodyPr/>
+          <a:lstStyle/>
+          <a:p>
+            <a:fld id="{1A032F50-0B60-B34B-8422-4E195A5AE2C1}" type="slidenum">
+              <a:rPr lang="en-US" smtClean="0"/>
+              <a:t>2</a:t>
+            </a:fld>
+            <a:endParaRPr lang="en-US"/>
+          </a:p>
+        </p:txBody>
+      </p:sp>
+    </p:spTree>
+    <p:extLst>
+      <p:ext uri="{BB962C8B-B14F-4D97-AF65-F5344CB8AC3E}">
+        <p14:creationId xmlns:p14="http://schemas.microsoft.com/office/powerpoint/2010/main" val="1350184375"/>
+      </p:ext>
+    </p:extLst>
+  </p:cSld>
+  <p:clrMapOvr>
+    <a:masterClrMapping/>
+  </p:clrMapOvr>
+</p:notes>
+</file>
+
+<file path=ppt/notesSlides/notesSlide3.xml><?xml version="1.0" encoding="utf-8"?>
 <p:notes xmlns:a="http://schemas.openxmlformats.org/drawingml/2006/main" xmlns:r="http://schemas.openxmlformats.org/officeDocument/2006/relationships" xmlns:p="http://schemas.openxmlformats.org/presentationml/2006/main" showMasterSp="0" showMasterPhAnim="0">
   <p:cSld>
     <p:spTree>
@@ -868,7 +952,7 @@
 </p:notes>
 </file>
 
-<file path=ppt/notesSlides/notesSlide3.xml><?xml version="1.0" encoding="utf-8"?>
+<file path=ppt/notesSlides/notesSlide4.xml><?xml version="1.0" encoding="utf-8"?>
 <p:notes xmlns:a="http://schemas.openxmlformats.org/drawingml/2006/main" xmlns:r="http://schemas.openxmlformats.org/officeDocument/2006/relationships" xmlns:p="http://schemas.openxmlformats.org/presentationml/2006/main" showMasterSp="0" showMasterPhAnim="0">
   <p:cSld>
     <p:spTree>
@@ -972,7 +1056,7 @@
 </p:notes>
 </file>
 
-<file path=ppt/notesSlides/notesSlide4.xml><?xml version="1.0" encoding="utf-8"?>
+<file path=ppt/notesSlides/notesSlide5.xml><?xml version="1.0" encoding="utf-8"?>
 <p:notes xmlns:a="http://schemas.openxmlformats.org/drawingml/2006/main" xmlns:r="http://schemas.openxmlformats.org/officeDocument/2006/relationships" xmlns:p="http://schemas.openxmlformats.org/presentationml/2006/main" showMasterSp="0" showMasterPhAnim="0">
   <p:cSld>
     <p:spTree>
@@ -1076,7 +1160,7 @@
 </p:notes>
 </file>
 
-<file path=ppt/notesSlides/notesSlide5.xml><?xml version="1.0" encoding="utf-8"?>
+<file path=ppt/notesSlides/notesSlide6.xml><?xml version="1.0" encoding="utf-8"?>
 <p:notes xmlns:a="http://schemas.openxmlformats.org/drawingml/2006/main" xmlns:r="http://schemas.openxmlformats.org/officeDocument/2006/relationships" xmlns:p="http://schemas.openxmlformats.org/presentationml/2006/main" showMasterSp="0" showMasterPhAnim="0">
   <p:cSld>
     <p:spTree>
@@ -1180,7 +1264,7 @@
 </p:notes>
 </file>
 
-<file path=ppt/notesSlides/notesSlide6.xml><?xml version="1.0" encoding="utf-8"?>
+<file path=ppt/notesSlides/notesSlide7.xml><?xml version="1.0" encoding="utf-8"?>
 <p:notes xmlns:a="http://schemas.openxmlformats.org/drawingml/2006/main" xmlns:r="http://schemas.openxmlformats.org/officeDocument/2006/relationships" xmlns:p="http://schemas.openxmlformats.org/presentationml/2006/main" showMasterSp="0" showMasterPhAnim="0">
   <p:cSld>
     <p:spTree>
@@ -1284,7 +1368,7 @@
 </p:notes>
 </file>
 
-<file path=ppt/notesSlides/notesSlide7.xml><?xml version="1.0" encoding="utf-8"?>
+<file path=ppt/notesSlides/notesSlide8.xml><?xml version="1.0" encoding="utf-8"?>
 <p:notes xmlns:a="http://schemas.openxmlformats.org/drawingml/2006/main" xmlns:r="http://schemas.openxmlformats.org/officeDocument/2006/relationships" xmlns:p="http://schemas.openxmlformats.org/presentationml/2006/main" showMasterSp="0" showMasterPhAnim="0">
   <p:cSld>
     <p:spTree>
@@ -1388,7 +1472,7 @@
 </p:notes>
 </file>
 
-<file path=ppt/notesSlides/notesSlide8.xml><?xml version="1.0" encoding="utf-8"?>
+<file path=ppt/notesSlides/notesSlide9.xml><?xml version="1.0" encoding="utf-8"?>
 <p:notes xmlns:a="http://schemas.openxmlformats.org/drawingml/2006/main" xmlns:r="http://schemas.openxmlformats.org/officeDocument/2006/relationships" xmlns:p="http://schemas.openxmlformats.org/presentationml/2006/main" showMasterSp="0" showMasterPhAnim="0">
   <p:cSld>
     <p:spTree>
@@ -10522,14 +10606,14 @@
           <a:lstStyle/>
           <a:p>
             <a:r>
-              <a:rPr lang="en-US" dirty="0">
+              <a:rPr lang="en-US" dirty="0" err="1">
                 <a:solidFill>
                   <a:srgbClr val="8888C6"/>
                 </a:solidFill>
                 <a:latin typeface="Consolas" panose="020B0609020204030204" pitchFamily="49" charset="0"/>
                 <a:cs typeface="Consolas" panose="020B0609020204030204" pitchFamily="49" charset="0"/>
               </a:rPr>
-              <a:t>print</a:t>
+              <a:t>chr</a:t>
             </a:r>
             <a:r>
               <a:rPr lang="en-US" dirty="0">
@@ -10546,7 +10630,7 @@
                 <a:latin typeface="Consolas" panose="020B0609020204030204" pitchFamily="49" charset="0"/>
                 <a:cs typeface="Consolas" panose="020B0609020204030204" pitchFamily="49" charset="0"/>
               </a:rPr>
-              <a:t>chr</a:t>
+              <a:t>ord</a:t>
             </a:r>
             <a:r>
               <a:rPr lang="en-US" dirty="0">
@@ -10556,55 +10640,82 @@
               <a:t>(</a:t>
             </a:r>
             <a:r>
-              <a:rPr lang="en-US" dirty="0" err="1">
-                <a:solidFill>
-                  <a:srgbClr val="8888C6"/>
+              <a:rPr lang="en-US" dirty="0">
+                <a:solidFill>
+                  <a:srgbClr val="6A8759"/>
                 </a:solidFill>
                 <a:latin typeface="Consolas" panose="020B0609020204030204" pitchFamily="49" charset="0"/>
                 <a:cs typeface="Consolas" panose="020B0609020204030204" pitchFamily="49" charset="0"/>
               </a:rPr>
-              <a:t>ord</a:t>
+              <a:t>'A'</a:t>
             </a:r>
             <a:r>
               <a:rPr lang="en-US" dirty="0">
                 <a:latin typeface="Consolas" panose="020B0609020204030204" pitchFamily="49" charset="0"/>
                 <a:cs typeface="Consolas" panose="020B0609020204030204" pitchFamily="49" charset="0"/>
               </a:rPr>
-              <a:t>(</a:t>
+              <a:t>)+</a:t>
             </a:r>
             <a:r>
               <a:rPr lang="en-US" dirty="0">
                 <a:solidFill>
-                  <a:srgbClr val="6A8759"/>
+                  <a:srgbClr val="6897BB"/>
                 </a:solidFill>
                 <a:latin typeface="Consolas" panose="020B0609020204030204" pitchFamily="49" charset="0"/>
                 <a:cs typeface="Consolas" panose="020B0609020204030204" pitchFamily="49" charset="0"/>
               </a:rPr>
-              <a:t>'A'</a:t>
+              <a:t>2</a:t>
             </a:r>
             <a:r>
               <a:rPr lang="en-US" dirty="0">
                 <a:latin typeface="Consolas" panose="020B0609020204030204" pitchFamily="49" charset="0"/>
                 <a:cs typeface="Consolas" panose="020B0609020204030204" pitchFamily="49" charset="0"/>
               </a:rPr>
-              <a:t>)+</a:t>
-            </a:r>
-            <a:r>
-              <a:rPr lang="en-US" dirty="0">
-                <a:solidFill>
-                  <a:srgbClr val="6897BB"/>
-                </a:solidFill>
-                <a:latin typeface="Consolas" panose="020B0609020204030204" pitchFamily="49" charset="0"/>
-                <a:cs typeface="Consolas" panose="020B0609020204030204" pitchFamily="49" charset="0"/>
-              </a:rPr>
-              <a:t>2</a:t>
-            </a:r>
-            <a:r>
-              <a:rPr lang="en-US" dirty="0">
-                <a:latin typeface="Consolas" panose="020B0609020204030204" pitchFamily="49" charset="0"/>
-                <a:cs typeface="Consolas" panose="020B0609020204030204" pitchFamily="49" charset="0"/>
-              </a:rPr>
-              <a:t>))</a:t>
+              <a:t>)</a:t>
+            </a:r>
+          </a:p>
+        </p:txBody>
+      </p:sp>
+      <p:sp>
+        <p:nvSpPr>
+          <p:cNvPr id="10" name="TextBox 9">
+            <a:extLst>
+              <a:ext uri="{FF2B5EF4-FFF2-40B4-BE49-F238E27FC236}">
+                <a16:creationId xmlns:a16="http://schemas.microsoft.com/office/drawing/2014/main" id="{1B3C6156-9E53-7840-BFD4-6E2FBC457FDE}"/>
+              </a:ext>
+            </a:extLst>
+          </p:cNvPr>
+          <p:cNvSpPr txBox="1"/>
+          <p:nvPr/>
+        </p:nvSpPr>
+        <p:spPr>
+          <a:xfrm>
+            <a:off x="9084514" y="6220623"/>
+            <a:ext cx="3950311" cy="400110"/>
+          </a:xfrm>
+          <a:prstGeom prst="rect">
+            <a:avLst/>
+          </a:prstGeom>
+          <a:noFill/>
+        </p:spPr>
+        <p:txBody>
+          <a:bodyPr wrap="square">
+            <a:spAutoFit/>
+          </a:bodyPr>
+          <a:lstStyle/>
+          <a:p>
+            <a:r>
+              <a:rPr lang="en-US" dirty="0" err="1">
+                <a:solidFill>
+                  <a:srgbClr val="8888C6"/>
+                </a:solidFill>
+                <a:effectLst/>
+              </a:rPr>
+              <a:t>len</a:t>
+            </a:r>
+            <a:r>
+              <a:rPr lang="en-US" dirty="0"/>
+              <a:t>(message) will also be useful</a:t>
             </a:r>
           </a:p>
         </p:txBody>
@@ -11249,7 +11360,7 @@
                 <a:effectLst/>
                 <a:latin typeface="Calibri" panose="020F0502020204030204" pitchFamily="34" charset="0"/>
                 <a:ea typeface="Calibri" panose="020F0502020204030204" pitchFamily="34" charset="0"/>
-                <a:hlinkClick r:id="rId2"/>
+                <a:hlinkClick r:id="rId3"/>
               </a:rPr>
               <a:t>https://forms.gle/UejirB4uDCJoRhGK9</a:t>
             </a:r>
@@ -11316,7 +11427,7 @@
         <p:spPr>
           <a:xfrm>
             <a:off x="5802489" y="174561"/>
-            <a:ext cx="7880153" cy="1938992"/>
+            <a:ext cx="7880153" cy="707886"/>
           </a:xfrm>
           <a:prstGeom prst="rect">
             <a:avLst/>
@@ -11339,16 +11450,7 @@
           <a:p>
             <a:r>
               <a:rPr lang="en-US" dirty="0"/>
-              <a:t>Are there any habits you have developed over the past 4 weeks that you want to improve / change going into the rest of the semester?</a:t>
-            </a:r>
-          </a:p>
-          <a:p>
-            <a:endParaRPr lang="en-US" dirty="0"/>
-          </a:p>
-          <a:p>
-            <a:r>
-              <a:rPr lang="en-US" dirty="0"/>
-              <a:t>How are you going to hold yourself accountable to building better habits?</a:t>
+              <a:t>How do you get your news?</a:t>
             </a:r>
           </a:p>
         </p:txBody>
@@ -13710,6 +13812,7 @@
             </a:r>
           </a:p>
           <a:p>
+            <a:pPr lvl="1"/>
             <a:r>
               <a:rPr lang="en-US" dirty="0" err="1">
                 <a:latin typeface="Consolas" panose="020B0609020204030204" pitchFamily="49" charset="0"/>

</xml_diff>